<commit_message>
Adding rabbitmq stream to GemFire CQ -> to stream processor
</commit_message>
<xml_diff>
--- a/docs/concepts/dashboard-wireframe.pptx
+++ b/docs/concepts/dashboard-wireframe.pptx
@@ -108,6 +108,11 @@
       </a:defRPr>
     </a:lvl9pPr>
   </p:defaultTextStyle>
+  <p:extLst>
+    <p:ext uri="{EFAFB233-063F-42B5-8137-9DF3F51BA10A}">
+      <p15:sldGuideLst xmlns:p15="http://schemas.microsoft.com/office/powerpoint/2012/main"/>
+    </p:ext>
+  </p:extLst>
 </p:presentation>
 </file>
 
@@ -193,7 +198,7 @@
           <a:p>
             <a:fld id="{3766C44B-53EF-BE44-990E-3F0AD29AC0A6}" type="datetimeFigureOut">
               <a:rPr lang="en-US" smtClean="0"/>
-              <a:t>7/2/22</a:t>
+              <a:t>7/11/22</a:t>
             </a:fld>
             <a:endParaRPr lang="en-US"/>
           </a:p>
@@ -899,7 +904,7 @@
           <a:p>
             <a:fld id="{942E4721-803B-334F-9505-91777EDC8CAF}" type="datetimeFigureOut">
               <a:rPr lang="en-US" smtClean="0"/>
-              <a:t>7/2/22</a:t>
+              <a:t>7/11/22</a:t>
             </a:fld>
             <a:endParaRPr lang="en-US"/>
           </a:p>
@@ -1097,7 +1102,7 @@
           <a:p>
             <a:fld id="{942E4721-803B-334F-9505-91777EDC8CAF}" type="datetimeFigureOut">
               <a:rPr lang="en-US" smtClean="0"/>
-              <a:t>7/2/22</a:t>
+              <a:t>7/11/22</a:t>
             </a:fld>
             <a:endParaRPr lang="en-US"/>
           </a:p>
@@ -1305,7 +1310,7 @@
           <a:p>
             <a:fld id="{942E4721-803B-334F-9505-91777EDC8CAF}" type="datetimeFigureOut">
               <a:rPr lang="en-US" smtClean="0"/>
-              <a:t>7/2/22</a:t>
+              <a:t>7/11/22</a:t>
             </a:fld>
             <a:endParaRPr lang="en-US"/>
           </a:p>
@@ -1503,7 +1508,7 @@
           <a:p>
             <a:fld id="{942E4721-803B-334F-9505-91777EDC8CAF}" type="datetimeFigureOut">
               <a:rPr lang="en-US" smtClean="0"/>
-              <a:t>7/2/22</a:t>
+              <a:t>7/11/22</a:t>
             </a:fld>
             <a:endParaRPr lang="en-US"/>
           </a:p>
@@ -1778,7 +1783,7 @@
           <a:p>
             <a:fld id="{942E4721-803B-334F-9505-91777EDC8CAF}" type="datetimeFigureOut">
               <a:rPr lang="en-US" smtClean="0"/>
-              <a:t>7/2/22</a:t>
+              <a:t>7/11/22</a:t>
             </a:fld>
             <a:endParaRPr lang="en-US"/>
           </a:p>
@@ -2043,7 +2048,7 @@
           <a:p>
             <a:fld id="{942E4721-803B-334F-9505-91777EDC8CAF}" type="datetimeFigureOut">
               <a:rPr lang="en-US" smtClean="0"/>
-              <a:t>7/2/22</a:t>
+              <a:t>7/11/22</a:t>
             </a:fld>
             <a:endParaRPr lang="en-US"/>
           </a:p>
@@ -2455,7 +2460,7 @@
           <a:p>
             <a:fld id="{942E4721-803B-334F-9505-91777EDC8CAF}" type="datetimeFigureOut">
               <a:rPr lang="en-US" smtClean="0"/>
-              <a:t>7/2/22</a:t>
+              <a:t>7/11/22</a:t>
             </a:fld>
             <a:endParaRPr lang="en-US"/>
           </a:p>
@@ -2596,7 +2601,7 @@
           <a:p>
             <a:fld id="{942E4721-803B-334F-9505-91777EDC8CAF}" type="datetimeFigureOut">
               <a:rPr lang="en-US" smtClean="0"/>
-              <a:t>7/2/22</a:t>
+              <a:t>7/11/22</a:t>
             </a:fld>
             <a:endParaRPr lang="en-US"/>
           </a:p>
@@ -2709,7 +2714,7 @@
           <a:p>
             <a:fld id="{942E4721-803B-334F-9505-91777EDC8CAF}" type="datetimeFigureOut">
               <a:rPr lang="en-US" smtClean="0"/>
-              <a:t>7/2/22</a:t>
+              <a:t>7/11/22</a:t>
             </a:fld>
             <a:endParaRPr lang="en-US"/>
           </a:p>
@@ -3020,7 +3025,7 @@
           <a:p>
             <a:fld id="{942E4721-803B-334F-9505-91777EDC8CAF}" type="datetimeFigureOut">
               <a:rPr lang="en-US" smtClean="0"/>
-              <a:t>7/2/22</a:t>
+              <a:t>7/11/22</a:t>
             </a:fld>
             <a:endParaRPr lang="en-US"/>
           </a:p>
@@ -3308,7 +3313,7 @@
           <a:p>
             <a:fld id="{942E4721-803B-334F-9505-91777EDC8CAF}" type="datetimeFigureOut">
               <a:rPr lang="en-US" smtClean="0"/>
-              <a:t>7/2/22</a:t>
+              <a:t>7/11/22</a:t>
             </a:fld>
             <a:endParaRPr lang="en-US"/>
           </a:p>
@@ -3549,7 +3554,7 @@
           <a:p>
             <a:fld id="{942E4721-803B-334F-9505-91777EDC8CAF}" type="datetimeFigureOut">
               <a:rPr lang="en-US" smtClean="0"/>
-              <a:t>7/2/22</a:t>
+              <a:t>7/11/22</a:t>
             </a:fld>
             <a:endParaRPr lang="en-US"/>
           </a:p>
@@ -3980,8 +3985,8 @@
         </p:nvSpPr>
         <p:spPr>
           <a:xfrm>
-            <a:off x="2558903" y="6195228"/>
-            <a:ext cx="4423144" cy="510363"/>
+            <a:off x="6051665" y="5408418"/>
+            <a:ext cx="4694309" cy="510363"/>
           </a:xfrm>
           <a:prstGeom prst="rect">
             <a:avLst/>
@@ -4031,8 +4036,8 @@
         </p:nvSpPr>
         <p:spPr>
           <a:xfrm>
-            <a:off x="2534093" y="5213493"/>
-            <a:ext cx="4423144" cy="510363"/>
+            <a:off x="5985164" y="4426683"/>
+            <a:ext cx="4736000" cy="510363"/>
           </a:xfrm>
           <a:prstGeom prst="rect">
             <a:avLst/>
@@ -4082,8 +4087,8 @@
         </p:nvSpPr>
         <p:spPr>
           <a:xfrm>
-            <a:off x="2555358" y="4320362"/>
-            <a:ext cx="4423144" cy="510363"/>
+            <a:off x="5968538" y="3533552"/>
+            <a:ext cx="4773891" cy="510363"/>
           </a:xfrm>
           <a:prstGeom prst="rect">
             <a:avLst/>
@@ -4133,8 +4138,8 @@
         </p:nvSpPr>
         <p:spPr>
           <a:xfrm>
-            <a:off x="2402958" y="3189768"/>
-            <a:ext cx="4423144" cy="510363"/>
+            <a:off x="5918662" y="2402958"/>
+            <a:ext cx="4671367" cy="510363"/>
           </a:xfrm>
           <a:prstGeom prst="rect">
             <a:avLst/>
@@ -4184,7 +4189,7 @@
         </p:nvSpPr>
         <p:spPr>
           <a:xfrm>
-            <a:off x="2708524" y="1399627"/>
+            <a:off x="2751055" y="910529"/>
             <a:ext cx="1948675" cy="369332"/>
           </a:xfrm>
           <a:prstGeom prst="rect">
@@ -4219,7 +4224,7 @@
         </p:nvSpPr>
         <p:spPr>
           <a:xfrm>
-            <a:off x="2476381" y="2626047"/>
+            <a:off x="6240308" y="1839237"/>
             <a:ext cx="1077026" cy="369332"/>
           </a:xfrm>
           <a:prstGeom prst="rect">
@@ -4254,7 +4259,7 @@
         </p:nvSpPr>
         <p:spPr>
           <a:xfrm>
-            <a:off x="4392327" y="2636827"/>
+            <a:off x="8156254" y="1850017"/>
             <a:ext cx="578969" cy="430799"/>
           </a:xfrm>
           <a:prstGeom prst="ellipse">
@@ -4309,7 +4314,7 @@
         </p:nvSpPr>
         <p:spPr>
           <a:xfrm>
-            <a:off x="5150370" y="2611099"/>
+            <a:off x="8914297" y="1824289"/>
             <a:ext cx="578969" cy="430799"/>
           </a:xfrm>
           <a:prstGeom prst="ellipse">
@@ -4364,7 +4369,7 @@
         </p:nvSpPr>
         <p:spPr>
           <a:xfrm>
-            <a:off x="5872785" y="2620995"/>
+            <a:off x="9636712" y="1834185"/>
             <a:ext cx="578969" cy="430799"/>
           </a:xfrm>
           <a:prstGeom prst="ellipse">
@@ -4419,7 +4424,7 @@
         </p:nvSpPr>
         <p:spPr>
           <a:xfrm>
-            <a:off x="1919337" y="2339944"/>
+            <a:off x="6002239" y="-126810"/>
             <a:ext cx="184731" cy="369332"/>
           </a:xfrm>
           <a:prstGeom prst="rect">
@@ -4451,7 +4456,7 @@
         </p:nvSpPr>
         <p:spPr>
           <a:xfrm>
-            <a:off x="2486277" y="3194083"/>
+            <a:off x="6250204" y="2407273"/>
             <a:ext cx="1385316" cy="369332"/>
           </a:xfrm>
           <a:prstGeom prst="rect">
@@ -4486,7 +4491,7 @@
         </p:nvSpPr>
         <p:spPr>
           <a:xfrm>
-            <a:off x="2508601" y="3842761"/>
+            <a:off x="6272528" y="3055951"/>
             <a:ext cx="1409360" cy="369332"/>
           </a:xfrm>
           <a:prstGeom prst="rect">
@@ -4521,7 +4526,7 @@
         </p:nvSpPr>
         <p:spPr>
           <a:xfrm>
-            <a:off x="2562882" y="4291848"/>
+            <a:off x="6326809" y="3505038"/>
             <a:ext cx="1772793" cy="369332"/>
           </a:xfrm>
           <a:prstGeom prst="rect">
@@ -4559,7 +4564,7 @@
         </p:nvSpPr>
         <p:spPr>
           <a:xfrm>
-            <a:off x="2526958" y="4800117"/>
+            <a:off x="6290885" y="4013307"/>
             <a:ext cx="1253869" cy="369332"/>
           </a:xfrm>
           <a:prstGeom prst="rect">
@@ -4602,7 +4607,7 @@
         </p:nvSpPr>
         <p:spPr>
           <a:xfrm>
-            <a:off x="2515247" y="5216190"/>
+            <a:off x="6279174" y="4429380"/>
             <a:ext cx="702436" cy="369332"/>
           </a:xfrm>
           <a:prstGeom prst="rect">
@@ -4643,7 +4648,7 @@
         </p:nvSpPr>
         <p:spPr>
           <a:xfrm>
-            <a:off x="2490984" y="5732022"/>
+            <a:off x="6254911" y="4945212"/>
             <a:ext cx="1939955" cy="369332"/>
           </a:xfrm>
           <a:prstGeom prst="rect">
@@ -4684,7 +4689,7 @@
         </p:nvSpPr>
         <p:spPr>
           <a:xfrm>
-            <a:off x="2302441" y="6308012"/>
+            <a:off x="6066368" y="5521202"/>
             <a:ext cx="2228431" cy="369332"/>
           </a:xfrm>
           <a:prstGeom prst="rect">
@@ -4718,7 +4723,7 @@
         </p:nvSpPr>
         <p:spPr>
           <a:xfrm>
-            <a:off x="4474990" y="3218984"/>
+            <a:off x="8238917" y="2432174"/>
             <a:ext cx="578969" cy="430799"/>
           </a:xfrm>
           <a:prstGeom prst="ellipse">
@@ -4773,7 +4778,7 @@
         </p:nvSpPr>
         <p:spPr>
           <a:xfrm>
-            <a:off x="5233033" y="3235786"/>
+            <a:off x="8996960" y="2448976"/>
             <a:ext cx="578969" cy="430799"/>
           </a:xfrm>
           <a:prstGeom prst="ellipse">
@@ -4828,7 +4833,7 @@
         </p:nvSpPr>
         <p:spPr>
           <a:xfrm>
-            <a:off x="6019244" y="3224415"/>
+            <a:off x="9783171" y="2437605"/>
             <a:ext cx="578969" cy="430799"/>
           </a:xfrm>
           <a:prstGeom prst="ellipse">
@@ -4883,7 +4888,7 @@
         </p:nvSpPr>
         <p:spPr>
           <a:xfrm>
-            <a:off x="4473010" y="3787017"/>
+            <a:off x="8236937" y="3000207"/>
             <a:ext cx="578969" cy="430799"/>
           </a:xfrm>
           <a:prstGeom prst="ellipse">
@@ -4938,7 +4943,7 @@
         </p:nvSpPr>
         <p:spPr>
           <a:xfrm>
-            <a:off x="5252319" y="3803819"/>
+            <a:off x="9016246" y="3017009"/>
             <a:ext cx="578969" cy="430799"/>
           </a:xfrm>
           <a:prstGeom prst="ellipse">
@@ -4993,7 +4998,7 @@
         </p:nvSpPr>
         <p:spPr>
           <a:xfrm>
-            <a:off x="6081058" y="3771187"/>
+            <a:off x="9844985" y="2984377"/>
             <a:ext cx="578969" cy="430799"/>
           </a:xfrm>
           <a:prstGeom prst="ellipse">
@@ -5048,7 +5053,7 @@
         </p:nvSpPr>
         <p:spPr>
           <a:xfrm>
-            <a:off x="4546707" y="4882667"/>
+            <a:off x="8310634" y="4095857"/>
             <a:ext cx="578969" cy="430799"/>
           </a:xfrm>
           <a:prstGeom prst="ellipse">
@@ -5103,7 +5108,7 @@
         </p:nvSpPr>
         <p:spPr>
           <a:xfrm>
-            <a:off x="5304750" y="4920734"/>
+            <a:off x="9068677" y="4133924"/>
             <a:ext cx="578969" cy="430799"/>
           </a:xfrm>
           <a:prstGeom prst="ellipse">
@@ -5158,7 +5163,7 @@
         </p:nvSpPr>
         <p:spPr>
           <a:xfrm>
-            <a:off x="6027165" y="4930630"/>
+            <a:off x="9791092" y="4143820"/>
             <a:ext cx="578969" cy="430799"/>
           </a:xfrm>
           <a:prstGeom prst="ellipse">
@@ -5213,7 +5218,7 @@
         </p:nvSpPr>
         <p:spPr>
           <a:xfrm>
-            <a:off x="4544727" y="5514497"/>
+            <a:off x="8308654" y="4727687"/>
             <a:ext cx="578969" cy="430799"/>
           </a:xfrm>
           <a:prstGeom prst="ellipse">
@@ -5268,7 +5273,7 @@
         </p:nvSpPr>
         <p:spPr>
           <a:xfrm>
-            <a:off x="5302770" y="5488769"/>
+            <a:off x="9066697" y="4701959"/>
             <a:ext cx="578969" cy="430799"/>
           </a:xfrm>
           <a:prstGeom prst="ellipse">
@@ -5323,7 +5328,7 @@
         </p:nvSpPr>
         <p:spPr>
           <a:xfrm>
-            <a:off x="6025185" y="5498665"/>
+            <a:off x="9789112" y="4711855"/>
             <a:ext cx="578969" cy="430799"/>
           </a:xfrm>
           <a:prstGeom prst="ellipse">
@@ -5378,7 +5383,7 @@
         </p:nvSpPr>
         <p:spPr>
           <a:xfrm>
-            <a:off x="4534928" y="6243973"/>
+            <a:off x="8298855" y="5457163"/>
             <a:ext cx="578969" cy="430799"/>
           </a:xfrm>
           <a:prstGeom prst="ellipse">
@@ -5433,7 +5438,7 @@
         </p:nvSpPr>
         <p:spPr>
           <a:xfrm>
-            <a:off x="5292971" y="6218245"/>
+            <a:off x="9056898" y="5431435"/>
             <a:ext cx="578969" cy="430799"/>
           </a:xfrm>
           <a:prstGeom prst="ellipse">
@@ -5488,7 +5493,7 @@
         </p:nvSpPr>
         <p:spPr>
           <a:xfrm>
-            <a:off x="6015386" y="6228141"/>
+            <a:off x="9779313" y="5441331"/>
             <a:ext cx="578969" cy="430799"/>
           </a:xfrm>
           <a:prstGeom prst="ellipse">
@@ -5556,8 +5561,8 @@
         </p:blipFill>
         <p:spPr bwMode="auto">
           <a:xfrm>
-            <a:off x="4892868" y="759636"/>
-            <a:ext cx="1210221" cy="1142987"/>
+            <a:off x="2893947" y="1929217"/>
+            <a:ext cx="2167151" cy="2046755"/>
           </a:xfrm>
           <a:prstGeom prst="rect">
             <a:avLst/>
@@ -5596,8 +5601,8 @@
         </p:blipFill>
         <p:spPr>
           <a:xfrm>
-            <a:off x="7200718" y="2576289"/>
-            <a:ext cx="3867150" cy="3814382"/>
+            <a:off x="3074125" y="4372392"/>
+            <a:ext cx="1858222" cy="1832867"/>
           </a:xfrm>
           <a:prstGeom prst="rect">
             <a:avLst/>
@@ -5653,7 +5658,7 @@
         </p:nvSpPr>
         <p:spPr>
           <a:xfrm>
-            <a:off x="2437394" y="2012903"/>
+            <a:off x="6201321" y="1226093"/>
             <a:ext cx="1335622" cy="584775"/>
           </a:xfrm>
           <a:prstGeom prst="rect">
@@ -5688,7 +5693,7 @@
         </p:nvSpPr>
         <p:spPr>
           <a:xfrm>
-            <a:off x="4439859" y="1995182"/>
+            <a:off x="8203786" y="1208372"/>
             <a:ext cx="1814343" cy="584775"/>
           </a:xfrm>
           <a:prstGeom prst="rect">
@@ -5763,7 +5768,7 @@
         </p:nvCxnSpPr>
         <p:spPr>
           <a:xfrm>
-            <a:off x="2704214" y="2066260"/>
+            <a:off x="2853069" y="6085366"/>
             <a:ext cx="8548577" cy="0"/>
           </a:xfrm>
           <a:prstGeom prst="line">
@@ -5799,7 +5804,7 @@
         </p:nvSpPr>
         <p:spPr>
           <a:xfrm>
-            <a:off x="4497820" y="4364717"/>
+            <a:off x="8261747" y="3577907"/>
             <a:ext cx="578969" cy="430799"/>
           </a:xfrm>
           <a:prstGeom prst="ellipse">
@@ -5854,7 +5859,7 @@
         </p:nvSpPr>
         <p:spPr>
           <a:xfrm>
-            <a:off x="5277129" y="4381519"/>
+            <a:off x="9041056" y="3594709"/>
             <a:ext cx="578969" cy="430799"/>
           </a:xfrm>
           <a:prstGeom prst="ellipse">
@@ -5909,7 +5914,7 @@
         </p:nvSpPr>
         <p:spPr>
           <a:xfrm>
-            <a:off x="6105868" y="4348887"/>
+            <a:off x="9869795" y="3562077"/>
             <a:ext cx="578969" cy="430799"/>
           </a:xfrm>
           <a:prstGeom prst="ellipse">

</xml_diff>